<commit_message>
Added to ReadMe file, changed names of CSV, added to report
</commit_message>
<xml_diff>
--- a/AERSP 424 Project Presentation.pptx
+++ b/AERSP 424 Project Presentation.pptx
@@ -6,6 +6,7 @@
   </p:sldMasterIdLst>
   <p:sldIdLst>
     <p:sldId id="256" r:id="rId2"/>
+    <p:sldId id="257" r:id="rId3"/>
   </p:sldIdLst>
   <p:sldSz cx="12192000" cy="6858000"/>
   <p:notesSz cx="6858000" cy="9144000"/>
@@ -104,6 +105,11 @@
       </a:defRPr>
     </a:lvl9pPr>
   </p:defaultTextStyle>
+  <p:extLst>
+    <p:ext uri="{EFAFB233-063F-42B5-8137-9DF3F51BA10A}">
+      <p15:sldGuideLst xmlns:p15="http://schemas.microsoft.com/office/powerpoint/2012/main"/>
+    </p:ext>
+  </p:extLst>
 </p:presentation>
 </file>
 
@@ -254,7 +260,7 @@
           <a:p>
             <a:fld id="{FA655AE2-3D42-458E-8415-31A8C9FDDF8A}" type="datetimeFigureOut">
               <a:rPr lang="en-US" smtClean="0"/>
-              <a:t>3/25/2024</a:t>
+              <a:t>3/31/2024</a:t>
             </a:fld>
             <a:endParaRPr lang="en-US"/>
           </a:p>
@@ -452,7 +458,7 @@
           <a:p>
             <a:fld id="{FA655AE2-3D42-458E-8415-31A8C9FDDF8A}" type="datetimeFigureOut">
               <a:rPr lang="en-US" smtClean="0"/>
-              <a:t>3/25/2024</a:t>
+              <a:t>3/31/2024</a:t>
             </a:fld>
             <a:endParaRPr lang="en-US"/>
           </a:p>
@@ -660,7 +666,7 @@
           <a:p>
             <a:fld id="{FA655AE2-3D42-458E-8415-31A8C9FDDF8A}" type="datetimeFigureOut">
               <a:rPr lang="en-US" smtClean="0"/>
-              <a:t>3/25/2024</a:t>
+              <a:t>3/31/2024</a:t>
             </a:fld>
             <a:endParaRPr lang="en-US"/>
           </a:p>
@@ -858,7 +864,7 @@
           <a:p>
             <a:fld id="{FA655AE2-3D42-458E-8415-31A8C9FDDF8A}" type="datetimeFigureOut">
               <a:rPr lang="en-US" smtClean="0"/>
-              <a:t>3/25/2024</a:t>
+              <a:t>3/31/2024</a:t>
             </a:fld>
             <a:endParaRPr lang="en-US"/>
           </a:p>
@@ -1133,7 +1139,7 @@
           <a:p>
             <a:fld id="{FA655AE2-3D42-458E-8415-31A8C9FDDF8A}" type="datetimeFigureOut">
               <a:rPr lang="en-US" smtClean="0"/>
-              <a:t>3/25/2024</a:t>
+              <a:t>3/31/2024</a:t>
             </a:fld>
             <a:endParaRPr lang="en-US"/>
           </a:p>
@@ -1398,7 +1404,7 @@
           <a:p>
             <a:fld id="{FA655AE2-3D42-458E-8415-31A8C9FDDF8A}" type="datetimeFigureOut">
               <a:rPr lang="en-US" smtClean="0"/>
-              <a:t>3/25/2024</a:t>
+              <a:t>3/31/2024</a:t>
             </a:fld>
             <a:endParaRPr lang="en-US"/>
           </a:p>
@@ -1810,7 +1816,7 @@
           <a:p>
             <a:fld id="{FA655AE2-3D42-458E-8415-31A8C9FDDF8A}" type="datetimeFigureOut">
               <a:rPr lang="en-US" smtClean="0"/>
-              <a:t>3/25/2024</a:t>
+              <a:t>3/31/2024</a:t>
             </a:fld>
             <a:endParaRPr lang="en-US"/>
           </a:p>
@@ -1951,7 +1957,7 @@
           <a:p>
             <a:fld id="{FA655AE2-3D42-458E-8415-31A8C9FDDF8A}" type="datetimeFigureOut">
               <a:rPr lang="en-US" smtClean="0"/>
-              <a:t>3/25/2024</a:t>
+              <a:t>3/31/2024</a:t>
             </a:fld>
             <a:endParaRPr lang="en-US"/>
           </a:p>
@@ -2064,7 +2070,7 @@
           <a:p>
             <a:fld id="{FA655AE2-3D42-458E-8415-31A8C9FDDF8A}" type="datetimeFigureOut">
               <a:rPr lang="en-US" smtClean="0"/>
-              <a:t>3/25/2024</a:t>
+              <a:t>3/31/2024</a:t>
             </a:fld>
             <a:endParaRPr lang="en-US"/>
           </a:p>
@@ -2375,7 +2381,7 @@
           <a:p>
             <a:fld id="{FA655AE2-3D42-458E-8415-31A8C9FDDF8A}" type="datetimeFigureOut">
               <a:rPr lang="en-US" smtClean="0"/>
-              <a:t>3/25/2024</a:t>
+              <a:t>3/31/2024</a:t>
             </a:fld>
             <a:endParaRPr lang="en-US"/>
           </a:p>
@@ -2663,7 +2669,7 @@
           <a:p>
             <a:fld id="{FA655AE2-3D42-458E-8415-31A8C9FDDF8A}" type="datetimeFigureOut">
               <a:rPr lang="en-US" smtClean="0"/>
-              <a:t>3/25/2024</a:t>
+              <a:t>3/31/2024</a:t>
             </a:fld>
             <a:endParaRPr lang="en-US"/>
           </a:p>
@@ -2904,7 +2910,7 @@
           <a:p>
             <a:fld id="{FA655AE2-3D42-458E-8415-31A8C9FDDF8A}" type="datetimeFigureOut">
               <a:rPr lang="en-US" smtClean="0"/>
-              <a:t>3/25/2024</a:t>
+              <a:t>3/31/2024</a:t>
             </a:fld>
             <a:endParaRPr lang="en-US"/>
           </a:p>
@@ -3415,6 +3421,274 @@
 </p:sld>
 </file>
 
+<file path=ppt/slides/slide2.xml><?xml version="1.0" encoding="utf-8"?>
+<p:sld xmlns:a="http://schemas.openxmlformats.org/drawingml/2006/main" xmlns:r="http://schemas.openxmlformats.org/officeDocument/2006/relationships" xmlns:p="http://schemas.openxmlformats.org/presentationml/2006/main">
+  <p:cSld>
+    <p:spTree>
+      <p:nvGrpSpPr>
+        <p:cNvPr id="1" name=""/>
+        <p:cNvGrpSpPr/>
+        <p:nvPr/>
+      </p:nvGrpSpPr>
+      <p:grpSpPr>
+        <a:xfrm>
+          <a:off x="0" y="0"/>
+          <a:ext cx="0" cy="0"/>
+          <a:chOff x="0" y="0"/>
+          <a:chExt cx="0" cy="0"/>
+        </a:xfrm>
+      </p:grpSpPr>
+      <p:sp>
+        <p:nvSpPr>
+          <p:cNvPr id="2" name="Title 1">
+            <a:extLst>
+              <a:ext uri="{FF2B5EF4-FFF2-40B4-BE49-F238E27FC236}">
+                <a16:creationId xmlns:a16="http://schemas.microsoft.com/office/drawing/2014/main" id="{C4249446-7649-984B-BD85-BC283165B916}"/>
+              </a:ext>
+            </a:extLst>
+          </p:cNvPr>
+          <p:cNvSpPr>
+            <a:spLocks noGrp="1"/>
+          </p:cNvSpPr>
+          <p:nvPr>
+            <p:ph type="title"/>
+          </p:nvPr>
+        </p:nvSpPr>
+        <p:spPr/>
+        <p:txBody>
+          <a:bodyPr/>
+          <a:lstStyle/>
+          <a:p>
+            <a:r>
+              <a:rPr lang="en-US" dirty="0"/>
+              <a:t>NFL Fantasy Football Mock Draft Simulator</a:t>
+            </a:r>
+          </a:p>
+        </p:txBody>
+      </p:sp>
+      <p:sp>
+        <p:nvSpPr>
+          <p:cNvPr id="3" name="Content Placeholder 2">
+            <a:extLst>
+              <a:ext uri="{FF2B5EF4-FFF2-40B4-BE49-F238E27FC236}">
+                <a16:creationId xmlns:a16="http://schemas.microsoft.com/office/drawing/2014/main" id="{BFDC09D8-0BA5-FB82-2A6E-BE540EF91393}"/>
+              </a:ext>
+            </a:extLst>
+          </p:cNvPr>
+          <p:cNvSpPr>
+            <a:spLocks noGrp="1"/>
+          </p:cNvSpPr>
+          <p:nvPr>
+            <p:ph idx="1"/>
+          </p:nvPr>
+        </p:nvSpPr>
+        <p:spPr>
+          <a:xfrm>
+            <a:off x="838200" y="1491088"/>
+            <a:ext cx="10515600" cy="4351338"/>
+          </a:xfrm>
+        </p:spPr>
+        <p:txBody>
+          <a:bodyPr>
+            <a:normAutofit/>
+          </a:bodyPr>
+          <a:lstStyle/>
+          <a:p>
+            <a:r>
+              <a:rPr lang="en-US" sz="2400" dirty="0"/>
+              <a:t>Team: Jayden Slotnick and Payton Glynn</a:t>
+            </a:r>
+          </a:p>
+          <a:p>
+            <a:r>
+              <a:rPr lang="en-US" sz="2400" dirty="0"/>
+              <a:t>Project description:</a:t>
+            </a:r>
+          </a:p>
+          <a:p>
+            <a:pPr lvl="1"/>
+            <a:r>
+              <a:rPr lang="en-US" sz="2000" dirty="0"/>
+              <a:t>Simulates a mock draft for the game of fantasy football</a:t>
+            </a:r>
+          </a:p>
+          <a:p>
+            <a:r>
+              <a:rPr lang="en-US" sz="2400" dirty="0"/>
+              <a:t>Capabilities</a:t>
+            </a:r>
+          </a:p>
+          <a:p>
+            <a:pPr lvl="1"/>
+            <a:r>
+              <a:rPr lang="en-US" sz="2000" dirty="0"/>
+              <a:t>Can run 3 types of drafts </a:t>
+            </a:r>
+          </a:p>
+          <a:p>
+            <a:pPr lvl="2"/>
+            <a:r>
+              <a:rPr lang="en-US" sz="1800" dirty="0"/>
+              <a:t>Standard, </a:t>
+            </a:r>
+          </a:p>
+          <a:p>
+            <a:pPr lvl="2"/>
+            <a:r>
+              <a:rPr lang="en-US" sz="1800" dirty="0"/>
+              <a:t>Points Per Reception (PPR) </a:t>
+            </a:r>
+          </a:p>
+          <a:p>
+            <a:pPr lvl="2"/>
+            <a:r>
+              <a:rPr lang="en-US" sz="1800" dirty="0"/>
+              <a:t>Half Points Per Reception (Half-PPR)</a:t>
+            </a:r>
+          </a:p>
+          <a:p>
+            <a:pPr lvl="1"/>
+            <a:r>
+              <a:rPr lang="en-US" sz="2000" dirty="0"/>
+              <a:t>Customizable league inputs such as position limits, round limits, and league size</a:t>
+            </a:r>
+          </a:p>
+          <a:p>
+            <a:pPr lvl="1"/>
+            <a:r>
+              <a:rPr lang="en-US" sz="2000" dirty="0"/>
+              <a:t>Allows user to have control over one draft slot</a:t>
+            </a:r>
+          </a:p>
+          <a:p>
+            <a:pPr lvl="1"/>
+            <a:r>
+              <a:rPr lang="en-US" sz="2000" dirty="0"/>
+              <a:t>Auto-drafts the remainder of the teams with randomness included</a:t>
+            </a:r>
+          </a:p>
+        </p:txBody>
+      </p:sp>
+      <p:pic>
+        <p:nvPicPr>
+          <p:cNvPr id="1026" name="Picture 2" descr="Image result for fantasy football">
+            <a:extLst>
+              <a:ext uri="{FF2B5EF4-FFF2-40B4-BE49-F238E27FC236}">
+                <a16:creationId xmlns:a16="http://schemas.microsoft.com/office/drawing/2014/main" id="{B3020F5F-74DD-0147-6198-147BE5276D2A}"/>
+              </a:ext>
+            </a:extLst>
+          </p:cNvPr>
+          <p:cNvPicPr>
+            <a:picLocks noChangeAspect="1" noChangeArrowheads="1"/>
+          </p:cNvPicPr>
+          <p:nvPr/>
+        </p:nvPicPr>
+        <p:blipFill>
+          <a:blip r:embed="rId2">
+            <a:extLst>
+              <a:ext uri="{28A0092B-C50C-407E-A947-70E740481C1C}">
+                <a14:useLocalDpi xmlns:a14="http://schemas.microsoft.com/office/drawing/2010/main" val="0"/>
+              </a:ext>
+            </a:extLst>
+          </a:blip>
+          <a:srcRect/>
+          <a:stretch>
+            <a:fillRect/>
+          </a:stretch>
+        </p:blipFill>
+        <p:spPr bwMode="auto">
+          <a:xfrm>
+            <a:off x="8699462" y="1491088"/>
+            <a:ext cx="2241743" cy="2290833"/>
+          </a:xfrm>
+          <a:prstGeom prst="rect">
+            <a:avLst/>
+          </a:prstGeom>
+          <a:noFill/>
+          <a:extLst>
+            <a:ext uri="{909E8E84-426E-40DD-AFC4-6F175D3DCCD1}">
+              <a14:hiddenFill xmlns:a14="http://schemas.microsoft.com/office/drawing/2010/main">
+                <a:solidFill>
+                  <a:srgbClr val="FFFFFF"/>
+                </a:solidFill>
+              </a14:hiddenFill>
+            </a:ext>
+          </a:extLst>
+        </p:spPr>
+      </p:pic>
+      <p:sp>
+        <p:nvSpPr>
+          <p:cNvPr id="4" name="TextBox 3">
+            <a:extLst>
+              <a:ext uri="{FF2B5EF4-FFF2-40B4-BE49-F238E27FC236}">
+                <a16:creationId xmlns:a16="http://schemas.microsoft.com/office/drawing/2014/main" id="{7C3D31C2-AA3D-4770-1AAA-D055379B2F30}"/>
+              </a:ext>
+            </a:extLst>
+          </p:cNvPr>
+          <p:cNvSpPr txBox="1"/>
+          <p:nvPr/>
+        </p:nvSpPr>
+        <p:spPr>
+          <a:xfrm>
+            <a:off x="8274204" y="3781921"/>
+            <a:ext cx="3713356" cy="338554"/>
+          </a:xfrm>
+          <a:prstGeom prst="rect">
+            <a:avLst/>
+          </a:prstGeom>
+          <a:noFill/>
+        </p:spPr>
+        <p:txBody>
+          <a:bodyPr wrap="square" rtlCol="0">
+            <a:spAutoFit/>
+          </a:bodyPr>
+          <a:lstStyle/>
+          <a:p>
+            <a:r>
+              <a:rPr lang="en-US" sz="800" b="0" i="0" dirty="0">
+                <a:solidFill>
+                  <a:srgbClr val="0D0D0D"/>
+                </a:solidFill>
+                <a:effectLst/>
+                <a:latin typeface="Söhne"/>
+              </a:rPr>
+              <a:t>Blossary.com. (2013, July 8). Fantasy Football. [Online]. Available: </a:t>
+            </a:r>
+            <a:r>
+              <a:rPr lang="en-US" sz="800" b="0" i="0" u="none" strike="noStrike" dirty="0">
+                <a:effectLst/>
+                <a:latin typeface="Söhne"/>
+                <a:hlinkClick r:id="rId3"/>
+              </a:rPr>
+              <a:t>https://www.blossary.com/Blossary:Fantasy_Football_twgid1377857220135678</a:t>
+            </a:r>
+            <a:r>
+              <a:rPr lang="en-US" sz="800" b="0" i="0" dirty="0">
+                <a:solidFill>
+                  <a:srgbClr val="0D0D0D"/>
+                </a:solidFill>
+                <a:effectLst/>
+                <a:latin typeface="Söhne"/>
+              </a:rPr>
+              <a:t>.</a:t>
+            </a:r>
+            <a:endParaRPr lang="en-US" sz="800" dirty="0"/>
+          </a:p>
+        </p:txBody>
+      </p:sp>
+    </p:spTree>
+    <p:extLst>
+      <p:ext uri="{BB962C8B-B14F-4D97-AF65-F5344CB8AC3E}">
+        <p14:creationId xmlns:p14="http://schemas.microsoft.com/office/powerpoint/2010/main" val="2732797920"/>
+      </p:ext>
+    </p:extLst>
+  </p:cSld>
+  <p:clrMapOvr>
+    <a:masterClrMapping/>
+  </p:clrMapOvr>
+</p:sld>
+</file>
+
 <file path=ppt/theme/theme1.xml><?xml version="1.0" encoding="utf-8"?>
 <a:theme xmlns:a="http://schemas.openxmlformats.org/drawingml/2006/main" name="Office Theme">
   <a:themeElements>

</xml_diff>